<commit_message>
Updated SPASE model figures, include PowerPOint presentation.
</commit_message>
<xml_diff>
--- a/docs/SPASE-Metadata-Model-for-Heliophysics.pptx
+++ b/docs/SPASE-Metadata-Model-for-Heliophysics.pptx
@@ -17,11 +17,10 @@
     <p:sldId id="264" r:id="rId11"/>
     <p:sldId id="266" r:id="rId12"/>
     <p:sldId id="267" r:id="rId13"/>
-    <p:sldId id="268" r:id="rId14"/>
-    <p:sldId id="269" r:id="rId15"/>
-    <p:sldId id="271" r:id="rId16"/>
-    <p:sldId id="270" r:id="rId17"/>
-    <p:sldId id="257" r:id="rId18"/>
+    <p:sldId id="269" r:id="rId14"/>
+    <p:sldId id="271" r:id="rId15"/>
+    <p:sldId id="270" r:id="rId16"/>
+    <p:sldId id="257" r:id="rId17"/>
   </p:sldIdLst>
   <p:sldSz cx="12192000" cy="6858000"/>
   <p:notesSz cx="6858000" cy="9144000"/>
@@ -259,7 +258,7 @@
           <a:p>
             <a:fld id="{ACEB70AD-51AA-4717-B6E1-EF4875A82218}" type="datetimeFigureOut">
               <a:rPr lang="en-US" smtClean="0"/>
-              <a:t>9/17/2021</a:t>
+              <a:t>10/12/2021</a:t>
             </a:fld>
             <a:endParaRPr lang="en-US"/>
           </a:p>
@@ -429,7 +428,7 @@
           <a:p>
             <a:fld id="{ACEB70AD-51AA-4717-B6E1-EF4875A82218}" type="datetimeFigureOut">
               <a:rPr lang="en-US" smtClean="0"/>
-              <a:t>9/17/2021</a:t>
+              <a:t>10/12/2021</a:t>
             </a:fld>
             <a:endParaRPr lang="en-US"/>
           </a:p>
@@ -609,7 +608,7 @@
           <a:p>
             <a:fld id="{ACEB70AD-51AA-4717-B6E1-EF4875A82218}" type="datetimeFigureOut">
               <a:rPr lang="en-US" smtClean="0"/>
-              <a:t>9/17/2021</a:t>
+              <a:t>10/12/2021</a:t>
             </a:fld>
             <a:endParaRPr lang="en-US"/>
           </a:p>
@@ -779,7 +778,7 @@
           <a:p>
             <a:fld id="{ACEB70AD-51AA-4717-B6E1-EF4875A82218}" type="datetimeFigureOut">
               <a:rPr lang="en-US" smtClean="0"/>
-              <a:t>9/17/2021</a:t>
+              <a:t>10/12/2021</a:t>
             </a:fld>
             <a:endParaRPr lang="en-US"/>
           </a:p>
@@ -1025,7 +1024,7 @@
           <a:p>
             <a:fld id="{ACEB70AD-51AA-4717-B6E1-EF4875A82218}" type="datetimeFigureOut">
               <a:rPr lang="en-US" smtClean="0"/>
-              <a:t>9/17/2021</a:t>
+              <a:t>10/12/2021</a:t>
             </a:fld>
             <a:endParaRPr lang="en-US"/>
           </a:p>
@@ -1257,7 +1256,7 @@
           <a:p>
             <a:fld id="{ACEB70AD-51AA-4717-B6E1-EF4875A82218}" type="datetimeFigureOut">
               <a:rPr lang="en-US" smtClean="0"/>
-              <a:t>9/17/2021</a:t>
+              <a:t>10/12/2021</a:t>
             </a:fld>
             <a:endParaRPr lang="en-US"/>
           </a:p>
@@ -1624,7 +1623,7 @@
           <a:p>
             <a:fld id="{ACEB70AD-51AA-4717-B6E1-EF4875A82218}" type="datetimeFigureOut">
               <a:rPr lang="en-US" smtClean="0"/>
-              <a:t>9/17/2021</a:t>
+              <a:t>10/12/2021</a:t>
             </a:fld>
             <a:endParaRPr lang="en-US"/>
           </a:p>
@@ -1742,7 +1741,7 @@
           <a:p>
             <a:fld id="{ACEB70AD-51AA-4717-B6E1-EF4875A82218}" type="datetimeFigureOut">
               <a:rPr lang="en-US" smtClean="0"/>
-              <a:t>9/17/2021</a:t>
+              <a:t>10/12/2021</a:t>
             </a:fld>
             <a:endParaRPr lang="en-US"/>
           </a:p>
@@ -1837,7 +1836,7 @@
           <a:p>
             <a:fld id="{ACEB70AD-51AA-4717-B6E1-EF4875A82218}" type="datetimeFigureOut">
               <a:rPr lang="en-US" smtClean="0"/>
-              <a:t>9/17/2021</a:t>
+              <a:t>10/12/2021</a:t>
             </a:fld>
             <a:endParaRPr lang="en-US"/>
           </a:p>
@@ -2114,7 +2113,7 @@
           <a:p>
             <a:fld id="{ACEB70AD-51AA-4717-B6E1-EF4875A82218}" type="datetimeFigureOut">
               <a:rPr lang="en-US" smtClean="0"/>
-              <a:t>9/17/2021</a:t>
+              <a:t>10/12/2021</a:t>
             </a:fld>
             <a:endParaRPr lang="en-US"/>
           </a:p>
@@ -2367,7 +2366,7 @@
           <a:p>
             <a:fld id="{ACEB70AD-51AA-4717-B6E1-EF4875A82218}" type="datetimeFigureOut">
               <a:rPr lang="en-US" smtClean="0"/>
-              <a:t>9/17/2021</a:t>
+              <a:t>10/12/2021</a:t>
             </a:fld>
             <a:endParaRPr lang="en-US"/>
           </a:p>
@@ -2580,7 +2579,7 @@
           <a:p>
             <a:fld id="{ACEB70AD-51AA-4717-B6E1-EF4875A82218}" type="datetimeFigureOut">
               <a:rPr lang="en-US" smtClean="0"/>
-              <a:t>9/17/2021</a:t>
+              <a:t>10/12/2021</a:t>
             </a:fld>
             <a:endParaRPr lang="en-US"/>
           </a:p>
@@ -3957,8 +3956,12 @@
               <a:buNone/>
             </a:pPr>
             <a:r>
+              <a:rPr lang="en-US" smtClean="0"/>
+              <a:t>15 </a:t>
+            </a:r>
+            <a:r>
               <a:rPr lang="en-US" dirty="0" smtClean="0"/>
-              <a:t>11 Repositories (all on </a:t>
+              <a:t>Repositories (all on </a:t>
             </a:r>
             <a:r>
               <a:rPr lang="en-US" dirty="0" smtClean="0">
@@ -4110,327 +4113,6 @@
           <a:p>
             <a:r>
               <a:rPr lang="en-US" dirty="0" smtClean="0"/>
-              <a:t>A Few More Stats</a:t>
-            </a:r>
-            <a:endParaRPr lang="en-US" dirty="0"/>
-          </a:p>
-        </p:txBody>
-      </p:sp>
-      <p:sp>
-        <p:nvSpPr>
-          <p:cNvPr id="3" name="Content Placeholder 2"/>
-          <p:cNvSpPr>
-            <a:spLocks noGrp="1"/>
-          </p:cNvSpPr>
-          <p:nvPr>
-            <p:ph idx="1"/>
-          </p:nvPr>
-        </p:nvSpPr>
-        <p:spPr/>
-        <p:txBody>
-          <a:bodyPr/>
-          <a:lstStyle/>
-          <a:p>
-            <a:pPr marL="0" indent="0">
-              <a:spcBef>
-                <a:spcPts val="1200"/>
-              </a:spcBef>
-              <a:buNone/>
-            </a:pPr>
-            <a:r>
-              <a:rPr lang="en-US" dirty="0" smtClean="0"/>
-              <a:t>Described Resources</a:t>
-            </a:r>
-          </a:p>
-          <a:p>
-            <a:pPr marL="457200" lvl="1" indent="0">
-              <a:spcBef>
-                <a:spcPts val="1200"/>
-              </a:spcBef>
-              <a:buNone/>
-            </a:pPr>
-            <a:r>
-              <a:rPr lang="en-US" dirty="0" smtClean="0"/>
-              <a:t>ASWS :     150</a:t>
-            </a:r>
-          </a:p>
-          <a:p>
-            <a:pPr marL="457200" lvl="1" indent="0">
-              <a:spcBef>
-                <a:spcPts val="1200"/>
-              </a:spcBef>
-              <a:buNone/>
-            </a:pPr>
-            <a:r>
-              <a:rPr lang="en-US" dirty="0" smtClean="0"/>
-              <a:t>CCMC :         7</a:t>
-            </a:r>
-          </a:p>
-          <a:p>
-            <a:pPr marL="457200" lvl="1" indent="0">
-              <a:spcBef>
-                <a:spcPts val="1200"/>
-              </a:spcBef>
-              <a:buNone/>
-            </a:pPr>
-            <a:r>
-              <a:rPr lang="en-US" dirty="0" smtClean="0"/>
-              <a:t>ESA     :     185</a:t>
-            </a:r>
-          </a:p>
-          <a:p>
-            <a:pPr marL="457200" lvl="1" indent="0">
-              <a:spcBef>
-                <a:spcPts val="1200"/>
-              </a:spcBef>
-              <a:buNone/>
-            </a:pPr>
-            <a:r>
-              <a:rPr lang="en-US" dirty="0" smtClean="0"/>
-              <a:t>GBO    : 1,222</a:t>
-            </a:r>
-          </a:p>
-          <a:p>
-            <a:pPr marL="457200" lvl="1" indent="0">
-              <a:spcBef>
-                <a:spcPts val="1200"/>
-              </a:spcBef>
-              <a:buNone/>
-            </a:pPr>
-            <a:r>
-              <a:rPr lang="en-US" dirty="0" smtClean="0"/>
-              <a:t>JAXA   :       56</a:t>
-            </a:r>
-          </a:p>
-          <a:p>
-            <a:pPr marL="457200" lvl="1" indent="0">
-              <a:spcBef>
-                <a:spcPts val="1200"/>
-              </a:spcBef>
-              <a:buNone/>
-            </a:pPr>
-            <a:r>
-              <a:rPr lang="en-US" dirty="0" smtClean="0"/>
-              <a:t>VSPO  :  2,446</a:t>
-            </a:r>
-          </a:p>
-          <a:p>
-            <a:pPr marL="457200" lvl="1" indent="0">
-              <a:spcBef>
-                <a:spcPts val="1200"/>
-              </a:spcBef>
-              <a:buNone/>
-            </a:pPr>
-            <a:r>
-              <a:rPr lang="en-US" dirty="0" smtClean="0"/>
-              <a:t>            =======</a:t>
-            </a:r>
-            <a:endParaRPr lang="en-US" dirty="0"/>
-          </a:p>
-          <a:p>
-            <a:pPr marL="457200" lvl="1" indent="0">
-              <a:spcBef>
-                <a:spcPts val="1200"/>
-              </a:spcBef>
-              <a:buNone/>
-            </a:pPr>
-            <a:r>
-              <a:rPr lang="en-US" dirty="0" smtClean="0"/>
-              <a:t>              4,066</a:t>
-            </a:r>
-          </a:p>
-          <a:p>
-            <a:pPr marL="457200" lvl="1" indent="0">
-              <a:spcBef>
-                <a:spcPts val="1200"/>
-              </a:spcBef>
-              <a:buNone/>
-            </a:pPr>
-            <a:endParaRPr lang="en-US" dirty="0"/>
-          </a:p>
-        </p:txBody>
-      </p:sp>
-    </p:spTree>
-    <p:extLst>
-      <p:ext uri="{BB962C8B-B14F-4D97-AF65-F5344CB8AC3E}">
-        <p14:creationId xmlns:p14="http://schemas.microsoft.com/office/powerpoint/2010/main" val="4171660522"/>
-      </p:ext>
-    </p:extLst>
-  </p:cSld>
-  <p:clrMapOvr>
-    <a:masterClrMapping/>
-  </p:clrMapOvr>
-  <p:timing>
-    <p:tnLst>
-      <p:par>
-        <p:cTn id="1" dur="indefinite" restart="never" nodeType="tmRoot">
-          <p:childTnLst>
-            <p:seq concurrent="1" nextAc="seek">
-              <p:cTn id="2" dur="indefinite" nodeType="mainSeq">
-                <p:childTnLst>
-                  <p:par>
-                    <p:cTn id="3" fill="hold">
-                      <p:stCondLst>
-                        <p:cond delay="indefinite"/>
-                      </p:stCondLst>
-                      <p:childTnLst>
-                        <p:par>
-                          <p:cTn id="4" fill="hold">
-                            <p:stCondLst>
-                              <p:cond delay="0"/>
-                            </p:stCondLst>
-                            <p:childTnLst>
-                              <p:par>
-                                <p:cTn id="5" presetID="10" presetClass="entr" presetSubtype="0" fill="hold" nodeType="clickEffect">
-                                  <p:stCondLst>
-                                    <p:cond delay="0"/>
-                                  </p:stCondLst>
-                                  <p:childTnLst>
-                                    <p:set>
-                                      <p:cBhvr>
-                                        <p:cTn id="6" dur="1" fill="hold">
-                                          <p:stCondLst>
-                                            <p:cond delay="0"/>
-                                          </p:stCondLst>
-                                        </p:cTn>
-                                        <p:tgtEl>
-                                          <p:spTgt spid="3">
-                                            <p:txEl>
-                                              <p:pRg st="7" end="7"/>
-                                            </p:txEl>
-                                          </p:spTgt>
-                                        </p:tgtEl>
-                                        <p:attrNameLst>
-                                          <p:attrName>style.visibility</p:attrName>
-                                        </p:attrNameLst>
-                                      </p:cBhvr>
-                                      <p:to>
-                                        <p:strVal val="visible"/>
-                                      </p:to>
-                                    </p:set>
-                                    <p:animEffect transition="in" filter="fade">
-                                      <p:cBhvr>
-                                        <p:cTn id="7" dur="500"/>
-                                        <p:tgtEl>
-                                          <p:spTgt spid="3">
-                                            <p:txEl>
-                                              <p:pRg st="7" end="7"/>
-                                            </p:txEl>
-                                          </p:spTgt>
-                                        </p:tgtEl>
-                                      </p:cBhvr>
-                                    </p:animEffect>
-                                  </p:childTnLst>
-                                </p:cTn>
-                              </p:par>
-                              <p:par>
-                                <p:cTn id="8" presetID="10" presetClass="entr" presetSubtype="0" fill="hold" nodeType="withEffect">
-                                  <p:stCondLst>
-                                    <p:cond delay="0"/>
-                                  </p:stCondLst>
-                                  <p:childTnLst>
-                                    <p:set>
-                                      <p:cBhvr>
-                                        <p:cTn id="9" dur="1" fill="hold">
-                                          <p:stCondLst>
-                                            <p:cond delay="0"/>
-                                          </p:stCondLst>
-                                        </p:cTn>
-                                        <p:tgtEl>
-                                          <p:spTgt spid="3">
-                                            <p:txEl>
-                                              <p:pRg st="8" end="8"/>
-                                            </p:txEl>
-                                          </p:spTgt>
-                                        </p:tgtEl>
-                                        <p:attrNameLst>
-                                          <p:attrName>style.visibility</p:attrName>
-                                        </p:attrNameLst>
-                                      </p:cBhvr>
-                                      <p:to>
-                                        <p:strVal val="visible"/>
-                                      </p:to>
-                                    </p:set>
-                                    <p:animEffect transition="in" filter="fade">
-                                      <p:cBhvr>
-                                        <p:cTn id="10" dur="500"/>
-                                        <p:tgtEl>
-                                          <p:spTgt spid="3">
-                                            <p:txEl>
-                                              <p:pRg st="8" end="8"/>
-                                            </p:txEl>
-                                          </p:spTgt>
-                                        </p:tgtEl>
-                                      </p:cBhvr>
-                                    </p:animEffect>
-                                  </p:childTnLst>
-                                </p:cTn>
-                              </p:par>
-                            </p:childTnLst>
-                          </p:cTn>
-                        </p:par>
-                      </p:childTnLst>
-                    </p:cTn>
-                  </p:par>
-                </p:childTnLst>
-              </p:cTn>
-              <p:prevCondLst>
-                <p:cond evt="onPrev" delay="0">
-                  <p:tgtEl>
-                    <p:sldTgt/>
-                  </p:tgtEl>
-                </p:cond>
-              </p:prevCondLst>
-              <p:nextCondLst>
-                <p:cond evt="onNext" delay="0">
-                  <p:tgtEl>
-                    <p:sldTgt/>
-                  </p:tgtEl>
-                </p:cond>
-              </p:nextCondLst>
-            </p:seq>
-          </p:childTnLst>
-        </p:cTn>
-      </p:par>
-    </p:tnLst>
-  </p:timing>
-</p:sld>
-</file>
-
-<file path=ppt/slides/slide14.xml><?xml version="1.0" encoding="utf-8"?>
-<p:sld xmlns:a="http://schemas.openxmlformats.org/drawingml/2006/main" xmlns:r="http://schemas.openxmlformats.org/officeDocument/2006/relationships" xmlns:p="http://schemas.openxmlformats.org/presentationml/2006/main">
-  <p:cSld>
-    <p:spTree>
-      <p:nvGrpSpPr>
-        <p:cNvPr id="1" name=""/>
-        <p:cNvGrpSpPr/>
-        <p:nvPr/>
-      </p:nvGrpSpPr>
-      <p:grpSpPr>
-        <a:xfrm>
-          <a:off x="0" y="0"/>
-          <a:ext cx="0" cy="0"/>
-          <a:chOff x="0" y="0"/>
-          <a:chExt cx="0" cy="0"/>
-        </a:xfrm>
-      </p:grpSpPr>
-      <p:sp>
-        <p:nvSpPr>
-          <p:cNvPr id="2" name="Title 1"/>
-          <p:cNvSpPr>
-            <a:spLocks noGrp="1"/>
-          </p:cNvSpPr>
-          <p:nvPr>
-            <p:ph type="title"/>
-          </p:nvPr>
-        </p:nvSpPr>
-        <p:spPr/>
-        <p:txBody>
-          <a:bodyPr/>
-          <a:lstStyle/>
-          <a:p>
-            <a:r>
-              <a:rPr lang="en-US" dirty="0" smtClean="0"/>
               <a:t>Happenings</a:t>
             </a:r>
             <a:endParaRPr lang="en-US" dirty="0"/>
@@ -4844,7 +4526,7 @@
 </p:sld>
 </file>
 
-<file path=ppt/slides/slide15.xml><?xml version="1.0" encoding="utf-8"?>
+<file path=ppt/slides/slide14.xml><?xml version="1.0" encoding="utf-8"?>
 <p:sld xmlns:a="http://schemas.openxmlformats.org/drawingml/2006/main" xmlns:r="http://schemas.openxmlformats.org/officeDocument/2006/relationships" xmlns:p="http://schemas.openxmlformats.org/presentationml/2006/main">
   <p:cSld>
     <p:spTree>
@@ -4981,7 +4663,7 @@
 </p:sld>
 </file>
 
-<file path=ppt/slides/slide16.xml><?xml version="1.0" encoding="utf-8"?>
+<file path=ppt/slides/slide15.xml><?xml version="1.0" encoding="utf-8"?>
 <p:sld xmlns:a="http://schemas.openxmlformats.org/drawingml/2006/main" xmlns:r="http://schemas.openxmlformats.org/officeDocument/2006/relationships" xmlns:p="http://schemas.openxmlformats.org/presentationml/2006/main">
   <p:cSld>
     <p:spTree>
@@ -5042,7 +4724,7 @@
 </p:sld>
 </file>
 
-<file path=ppt/slides/slide17.xml><?xml version="1.0" encoding="utf-8"?>
+<file path=ppt/slides/slide16.xml><?xml version="1.0" encoding="utf-8"?>
 <p:sld xmlns:a="http://schemas.openxmlformats.org/drawingml/2006/main" xmlns:r="http://schemas.openxmlformats.org/officeDocument/2006/relationships" xmlns:p="http://schemas.openxmlformats.org/presentationml/2006/main">
   <p:cSld>
     <p:spTree>
@@ -5539,9 +5221,9 @@
           <p:nvPr/>
         </p:nvCxnSpPr>
         <p:spPr>
-          <a:xfrm>
-            <a:off x="888823" y="3571348"/>
-            <a:ext cx="10863175" cy="0"/>
+          <a:xfrm flipV="1">
+            <a:off x="507823" y="3529778"/>
+            <a:ext cx="11446489" cy="41571"/>
           </a:xfrm>
           <a:prstGeom prst="line">
             <a:avLst/>
@@ -5571,10 +5253,10 @@
         </p:nvGrpSpPr>
         <p:grpSpPr>
           <a:xfrm>
-            <a:off x="165483" y="1918396"/>
-            <a:ext cx="2362313" cy="2252386"/>
-            <a:chOff x="322239" y="1918396"/>
-            <a:chExt cx="2362313" cy="2252386"/>
+            <a:off x="161660" y="2153287"/>
+            <a:ext cx="1951724" cy="2017495"/>
+            <a:chOff x="699416" y="2153287"/>
+            <a:chExt cx="1951724" cy="2017495"/>
           </a:xfrm>
         </p:grpSpPr>
         <p:cxnSp>
@@ -5648,8 +5330,8 @@
           </p:nvSpPr>
           <p:spPr>
             <a:xfrm>
-              <a:off x="322239" y="1918396"/>
-              <a:ext cx="2362313" cy="1077218"/>
+              <a:off x="699416" y="2153287"/>
+              <a:ext cx="1951724" cy="830997"/>
             </a:xfrm>
             <a:prstGeom prst="rect">
               <a:avLst/>
@@ -5664,24 +5346,24 @@
             </a:ln>
           </p:spPr>
           <p:txBody>
-            <a:bodyPr wrap="none" rtlCol="0">
+            <a:bodyPr wrap="square" rtlCol="0">
               <a:spAutoFit/>
             </a:bodyPr>
             <a:lstStyle/>
             <a:p>
               <a:pPr algn="ctr"/>
               <a:r>
-                <a:rPr lang="en-US" sz="3200" dirty="0" smtClean="0"/>
+                <a:rPr lang="en-US" sz="2400" dirty="0" smtClean="0"/>
                 <a:t>ISTP @ RAL</a:t>
               </a:r>
             </a:p>
             <a:p>
               <a:pPr algn="ctr"/>
               <a:r>
-                <a:rPr lang="en-US" sz="3200" dirty="0" smtClean="0"/>
+                <a:rPr lang="en-US" sz="2400" dirty="0" smtClean="0"/>
                 <a:t>Call to action</a:t>
               </a:r>
-              <a:endParaRPr lang="en-US" sz="3200" dirty="0"/>
+              <a:endParaRPr lang="en-US" sz="2400" dirty="0"/>
             </a:p>
           </p:txBody>
         </p:sp>
@@ -5694,7 +5376,7 @@
         </p:nvGrpSpPr>
         <p:grpSpPr>
           <a:xfrm>
-            <a:off x="1661961" y="2984284"/>
+            <a:off x="1280961" y="2984284"/>
             <a:ext cx="2417841" cy="3069517"/>
             <a:chOff x="1818717" y="2984284"/>
             <a:chExt cx="2417841" cy="3069517"/>
@@ -5819,7 +5501,7 @@
         </p:nvGrpSpPr>
         <p:grpSpPr>
           <a:xfrm>
-            <a:off x="2776302" y="1945340"/>
+            <a:off x="2395302" y="1945340"/>
             <a:ext cx="1963423" cy="2225442"/>
             <a:chOff x="2933058" y="1945340"/>
             <a:chExt cx="1963423" cy="2225442"/>
@@ -5937,7 +5619,7 @@
         </p:nvGrpSpPr>
         <p:grpSpPr>
           <a:xfrm>
-            <a:off x="3345063" y="2982979"/>
+            <a:off x="2964063" y="2982979"/>
             <a:ext cx="2129109" cy="1883678"/>
             <a:chOff x="3501819" y="2982979"/>
             <a:chExt cx="2129109" cy="1883678"/>
@@ -6055,7 +5737,7 @@
         </p:nvGrpSpPr>
         <p:grpSpPr>
           <a:xfrm>
-            <a:off x="4928782" y="2406319"/>
+            <a:off x="4547782" y="2406319"/>
             <a:ext cx="915635" cy="1807304"/>
             <a:chOff x="5085538" y="2406319"/>
             <a:chExt cx="915635" cy="1807304"/>
@@ -6171,7 +5853,7 @@
         </p:nvGrpSpPr>
         <p:grpSpPr>
           <a:xfrm>
-            <a:off x="5306216" y="2925282"/>
+            <a:off x="4925216" y="2925282"/>
             <a:ext cx="1602105" cy="3128519"/>
             <a:chOff x="5462972" y="2925282"/>
             <a:chExt cx="1602105" cy="3128519"/>
@@ -6297,7 +5979,7 @@
         </p:nvGrpSpPr>
         <p:grpSpPr>
           <a:xfrm>
-            <a:off x="6301532" y="2420090"/>
+            <a:off x="5920532" y="2420090"/>
             <a:ext cx="915635" cy="1807304"/>
             <a:chOff x="6457808" y="2406319"/>
             <a:chExt cx="915635" cy="1807304"/>
@@ -6413,7 +6095,7 @@
         </p:nvGrpSpPr>
         <p:grpSpPr>
           <a:xfrm>
-            <a:off x="7598199" y="2406319"/>
+            <a:off x="7217199" y="2406319"/>
             <a:ext cx="1018228" cy="1807304"/>
             <a:chOff x="7754955" y="2406319"/>
             <a:chExt cx="1018228" cy="1807304"/>
@@ -6529,7 +6211,7 @@
         </p:nvGrpSpPr>
         <p:grpSpPr>
           <a:xfrm>
-            <a:off x="9002020" y="2406319"/>
+            <a:off x="8621020" y="2406319"/>
             <a:ext cx="1018228" cy="1756970"/>
             <a:chOff x="9158776" y="2406319"/>
             <a:chExt cx="1018228" cy="1756970"/>
@@ -6645,7 +6327,7 @@
         </p:nvGrpSpPr>
         <p:grpSpPr>
           <a:xfrm>
-            <a:off x="6891586" y="2982979"/>
+            <a:off x="6510586" y="2982979"/>
             <a:ext cx="1018228" cy="1759121"/>
             <a:chOff x="7048342" y="2982979"/>
             <a:chExt cx="1018228" cy="1759121"/>
@@ -6761,7 +6443,7 @@
         </p:nvGrpSpPr>
         <p:grpSpPr>
           <a:xfrm>
-            <a:off x="8345156" y="2977527"/>
+            <a:off x="7964156" y="2977527"/>
             <a:ext cx="1018228" cy="1759121"/>
             <a:chOff x="8501912" y="2977527"/>
             <a:chExt cx="1018228" cy="1759121"/>
@@ -6881,22 +6563,24 @@
         </p:nvGrpSpPr>
         <p:grpSpPr>
           <a:xfrm>
-            <a:off x="9409512" y="2977527"/>
-            <a:ext cx="1966629" cy="3076274"/>
-            <a:chOff x="9566268" y="2977527"/>
-            <a:chExt cx="1966629" cy="3076274"/>
+            <a:off x="9006234" y="2945882"/>
+            <a:ext cx="1966629" cy="3323695"/>
+            <a:chOff x="9570214" y="2977527"/>
+            <a:chExt cx="1966629" cy="3323695"/>
           </a:xfrm>
         </p:grpSpPr>
         <p:cxnSp>
           <p:nvCxnSpPr>
             <p:cNvPr id="62" name="Straight Connector 61"/>
-            <p:cNvCxnSpPr/>
+            <p:cNvCxnSpPr>
+              <a:endCxn id="63" idx="0"/>
+            </p:cNvCxnSpPr>
             <p:nvPr/>
           </p:nvCxnSpPr>
           <p:spPr>
-            <a:xfrm>
-              <a:off x="10597373" y="3569204"/>
-              <a:ext cx="30493" cy="1407379"/>
+            <a:xfrm flipH="1">
+              <a:off x="10553529" y="3582616"/>
+              <a:ext cx="18178" cy="1641388"/>
             </a:xfrm>
             <a:prstGeom prst="line">
               <a:avLst/>
@@ -6928,7 +6612,7 @@
           </p:nvSpPr>
           <p:spPr>
             <a:xfrm>
-              <a:off x="9566268" y="4976583"/>
+              <a:off x="9570214" y="5224004"/>
               <a:ext cx="1966629" cy="1077218"/>
             </a:xfrm>
             <a:prstGeom prst="rect">
@@ -7004,7 +6688,7 @@
         </p:nvGrpSpPr>
         <p:grpSpPr>
           <a:xfrm>
-            <a:off x="10733771" y="1881481"/>
+            <a:off x="10352771" y="1881481"/>
             <a:ext cx="1018227" cy="2281808"/>
             <a:chOff x="10890527" y="1881481"/>
             <a:chExt cx="1018227" cy="2281808"/>
@@ -7119,6 +6803,129 @@
           </p:txBody>
         </p:sp>
       </p:grpSp>
+      <p:grpSp>
+        <p:nvGrpSpPr>
+          <p:cNvPr id="65" name="Group 64"/>
+          <p:cNvGrpSpPr/>
+          <p:nvPr/>
+        </p:nvGrpSpPr>
+        <p:grpSpPr>
+          <a:xfrm>
+            <a:off x="10829003" y="2952360"/>
+            <a:ext cx="1305678" cy="2128453"/>
+            <a:chOff x="8231187" y="2977527"/>
+            <a:chExt cx="1305678" cy="2128453"/>
+          </a:xfrm>
+        </p:grpSpPr>
+        <p:cxnSp>
+          <p:nvCxnSpPr>
+            <p:cNvPr id="66" name="Straight Connector 65"/>
+            <p:cNvCxnSpPr/>
+            <p:nvPr/>
+          </p:nvCxnSpPr>
+          <p:spPr>
+            <a:xfrm>
+              <a:off x="9011025" y="3569204"/>
+              <a:ext cx="12916" cy="596126"/>
+            </a:xfrm>
+            <a:prstGeom prst="line">
+              <a:avLst/>
+            </a:prstGeom>
+            <a:ln w="101600">
+              <a:headEnd type="oval"/>
+            </a:ln>
+          </p:spPr>
+          <p:style>
+            <a:lnRef idx="1">
+              <a:schemeClr val="accent1"/>
+            </a:lnRef>
+            <a:fillRef idx="0">
+              <a:schemeClr val="accent1"/>
+            </a:fillRef>
+            <a:effectRef idx="0">
+              <a:schemeClr val="accent1"/>
+            </a:effectRef>
+            <a:fontRef idx="minor">
+              <a:schemeClr val="tx1"/>
+            </a:fontRef>
+          </p:style>
+        </p:cxnSp>
+        <p:sp>
+          <p:nvSpPr>
+            <p:cNvPr id="67" name="TextBox 66"/>
+            <p:cNvSpPr txBox="1"/>
+            <p:nvPr/>
+          </p:nvSpPr>
+          <p:spPr>
+            <a:xfrm>
+              <a:off x="8231187" y="4151873"/>
+              <a:ext cx="1305678" cy="954107"/>
+            </a:xfrm>
+            <a:prstGeom prst="rect">
+              <a:avLst/>
+            </a:prstGeom>
+            <a:noFill/>
+            <a:ln w="12700">
+              <a:solidFill>
+                <a:schemeClr val="bg1">
+                  <a:lumMod val="75000"/>
+                </a:schemeClr>
+              </a:solidFill>
+            </a:ln>
+          </p:spPr>
+          <p:txBody>
+            <a:bodyPr wrap="none" rtlCol="0">
+              <a:spAutoFit/>
+            </a:bodyPr>
+            <a:lstStyle/>
+            <a:p>
+              <a:pPr algn="ctr"/>
+              <a:r>
+                <a:rPr lang="en-US" sz="3200" dirty="0" smtClean="0"/>
+                <a:t>2.4.0</a:t>
+              </a:r>
+            </a:p>
+            <a:p>
+              <a:pPr algn="ctr"/>
+              <a:r>
+                <a:rPr lang="en-US" sz="2400" dirty="0" smtClean="0"/>
+                <a:t>Software</a:t>
+              </a:r>
+              <a:endParaRPr lang="en-US" sz="2400" dirty="0"/>
+            </a:p>
+          </p:txBody>
+        </p:sp>
+        <p:sp>
+          <p:nvSpPr>
+            <p:cNvPr id="69" name="TextBox 68"/>
+            <p:cNvSpPr txBox="1"/>
+            <p:nvPr/>
+          </p:nvSpPr>
+          <p:spPr>
+            <a:xfrm>
+              <a:off x="8559665" y="2977527"/>
+              <a:ext cx="915635" cy="523220"/>
+            </a:xfrm>
+            <a:prstGeom prst="rect">
+              <a:avLst/>
+            </a:prstGeom>
+            <a:noFill/>
+          </p:spPr>
+          <p:txBody>
+            <a:bodyPr wrap="none" rtlCol="0">
+              <a:spAutoFit/>
+            </a:bodyPr>
+            <a:lstStyle/>
+            <a:p>
+              <a:r>
+                <a:rPr lang="en-US" sz="2800" dirty="0" smtClean="0"/>
+                <a:t>2021</a:t>
+              </a:r>
+              <a:endParaRPr lang="en-US" sz="2800" dirty="0"/>
+            </a:p>
+          </p:txBody>
+        </p:sp>
+      </p:grpSp>
     </p:spTree>
     <p:extLst>
       <p:ext uri="{BB962C8B-B14F-4D97-AF65-F5344CB8AC3E}">
@@ -8197,6 +8004,88 @@
                                         <p:tav tm="0">
                                           <p:val>
                                             <p:strVal val="0-#ppt_h/2"/>
+                                          </p:val>
+                                        </p:tav>
+                                        <p:tav tm="100000">
+                                          <p:val>
+                                            <p:strVal val="#ppt_y"/>
+                                          </p:val>
+                                        </p:tav>
+                                      </p:tavLst>
+                                    </p:anim>
+                                  </p:childTnLst>
+                                </p:cTn>
+                              </p:par>
+                            </p:childTnLst>
+                          </p:cTn>
+                        </p:par>
+                        <p:par>
+                          <p:cTn id="69" fill="hold">
+                            <p:stCondLst>
+                              <p:cond delay="9100"/>
+                            </p:stCondLst>
+                            <p:childTnLst>
+                              <p:par>
+                                <p:cTn id="70" presetID="2" presetClass="entr" presetSubtype="4" fill="hold" nodeType="afterEffect">
+                                  <p:stCondLst>
+                                    <p:cond delay="0"/>
+                                  </p:stCondLst>
+                                  <p:childTnLst>
+                                    <p:set>
+                                      <p:cBhvr>
+                                        <p:cTn id="71" dur="1" fill="hold">
+                                          <p:stCondLst>
+                                            <p:cond delay="0"/>
+                                          </p:stCondLst>
+                                        </p:cTn>
+                                        <p:tgtEl>
+                                          <p:spTgt spid="65"/>
+                                        </p:tgtEl>
+                                        <p:attrNameLst>
+                                          <p:attrName>style.visibility</p:attrName>
+                                        </p:attrNameLst>
+                                      </p:cBhvr>
+                                      <p:to>
+                                        <p:strVal val="visible"/>
+                                      </p:to>
+                                    </p:set>
+                                    <p:anim calcmode="lin" valueType="num">
+                                      <p:cBhvr additive="base">
+                                        <p:cTn id="72" dur="700" fill="hold"/>
+                                        <p:tgtEl>
+                                          <p:spTgt spid="65"/>
+                                        </p:tgtEl>
+                                        <p:attrNameLst>
+                                          <p:attrName>ppt_x</p:attrName>
+                                        </p:attrNameLst>
+                                      </p:cBhvr>
+                                      <p:tavLst>
+                                        <p:tav tm="0">
+                                          <p:val>
+                                            <p:strVal val="#ppt_x"/>
+                                          </p:val>
+                                        </p:tav>
+                                        <p:tav tm="100000">
+                                          <p:val>
+                                            <p:strVal val="#ppt_x"/>
+                                          </p:val>
+                                        </p:tav>
+                                      </p:tavLst>
+                                    </p:anim>
+                                    <p:anim calcmode="lin" valueType="num">
+                                      <p:cBhvr additive="base">
+                                        <p:cTn id="73" dur="700" fill="hold"/>
+                                        <p:tgtEl>
+                                          <p:spTgt spid="65"/>
+                                        </p:tgtEl>
+                                        <p:attrNameLst>
+                                          <p:attrName>ppt_y</p:attrName>
+                                        </p:attrNameLst>
+                                      </p:cBhvr>
+                                      <p:tavLst>
+                                        <p:tav tm="0">
+                                          <p:val>
+                                            <p:strVal val="1+#ppt_h/2"/>
                                           </p:val>
                                         </p:tav>
                                         <p:tav tm="100000">
@@ -8257,40 +8146,6 @@
           <a:chExt cx="0" cy="0"/>
         </a:xfrm>
       </p:grpSpPr>
-      <p:cxnSp>
-        <p:nvCxnSpPr>
-          <p:cNvPr id="71" name="Elbow Connector 70"/>
-          <p:cNvCxnSpPr/>
-          <p:nvPr/>
-        </p:nvCxnSpPr>
-        <p:spPr>
-          <a:xfrm rot="16200000" flipH="1">
-            <a:off x="7279688" y="1329167"/>
-            <a:ext cx="774286" cy="1332230"/>
-          </a:xfrm>
-          <a:prstGeom prst="bentConnector2">
-            <a:avLst/>
-          </a:prstGeom>
-          <a:ln w="25400">
-            <a:headEnd type="none" w="med" len="med"/>
-            <a:tailEnd type="triangle" w="med" len="med"/>
-          </a:ln>
-        </p:spPr>
-        <p:style>
-          <a:lnRef idx="3">
-            <a:schemeClr val="dk1"/>
-          </a:lnRef>
-          <a:fillRef idx="0">
-            <a:schemeClr val="dk1"/>
-          </a:fillRef>
-          <a:effectRef idx="2">
-            <a:schemeClr val="dk1"/>
-          </a:effectRef>
-          <a:fontRef idx="minor">
-            <a:schemeClr val="tx1"/>
-          </a:fontRef>
-        </p:style>
-      </p:cxnSp>
       <p:sp>
         <p:nvSpPr>
           <p:cNvPr id="2" name="Title 1"/>
@@ -8303,7 +8158,7 @@
         </p:nvSpPr>
         <p:spPr>
           <a:xfrm>
-            <a:off x="838200" y="365125"/>
+            <a:off x="596485" y="590391"/>
             <a:ext cx="3076417" cy="1325563"/>
           </a:xfrm>
         </p:spPr>
@@ -8330,6 +8185,13 @@
             <a:r>
               <a:rPr lang="en-US" dirty="0" smtClean="0"/>
               <a:t>Model</a:t>
+            </a:r>
+            <a:br>
+              <a:rPr lang="en-US" dirty="0" smtClean="0"/>
+            </a:br>
+            <a:r>
+              <a:rPr lang="en-US" dirty="0" smtClean="0"/>
+              <a:t>2.4.0</a:t>
             </a:r>
             <a:endParaRPr lang="en-US" dirty="0"/>
           </a:p>
@@ -8379,7 +8241,7 @@
         </p:nvSpPr>
         <p:spPr>
           <a:xfrm>
-            <a:off x="6560026" y="2497138"/>
+            <a:off x="6577969" y="2497138"/>
             <a:ext cx="886460" cy="556260"/>
           </a:xfrm>
           <a:prstGeom prst="flowChartDocument">
@@ -9329,14 +9191,14 @@
               </a:spcAft>
             </a:pPr>
             <a:r>
-              <a:rPr lang="en-US" sz="1200" b="1">
+              <a:rPr lang="en-US" sz="1200" b="1" dirty="0">
                 <a:effectLst/>
                 <a:latin typeface="Times New Roman" panose="02020603050405020304" pitchFamily="18" charset="0"/>
                 <a:ea typeface="Calibri" panose="020F0502020204030204" pitchFamily="34" charset="0"/>
               </a:rPr>
               <a:t>Simulation Model</a:t>
             </a:r>
-            <a:endParaRPr lang="en-US" sz="1200">
+            <a:endParaRPr lang="en-US" sz="1200" dirty="0">
               <a:effectLst/>
               <a:latin typeface="Times New Roman" panose="02020603050405020304" pitchFamily="18" charset="0"/>
               <a:ea typeface="Times New Roman" panose="02020603050405020304" pitchFamily="18" charset="0"/>
@@ -9605,7 +9467,7 @@
         </p:nvCxnSpPr>
         <p:spPr>
           <a:xfrm flipH="1">
-            <a:off x="9462595" y="593124"/>
+            <a:off x="9589595" y="593124"/>
             <a:ext cx="12566" cy="2113848"/>
           </a:xfrm>
           <a:prstGeom prst="line">
@@ -9639,7 +9501,7 @@
         </p:nvSpPr>
         <p:spPr>
           <a:xfrm>
-            <a:off x="9610563" y="479441"/>
+            <a:off x="9737563" y="479441"/>
             <a:ext cx="336550" cy="2398635"/>
           </a:xfrm>
           <a:prstGeom prst="rect">
@@ -9818,7 +9680,7 @@
               </a:spcAft>
             </a:pPr>
             <a:r>
-              <a:rPr lang="en-US" sz="1600" dirty="0" err="1">
+              <a:rPr lang="en-US" sz="1600" dirty="0">
                 <a:effectLst/>
                 <a:latin typeface="Times New Roman" panose="02020603050405020304" pitchFamily="18" charset="0"/>
                 <a:ea typeface="Calibri" panose="020F0502020204030204" pitchFamily="34" charset="0"/>
@@ -9922,7 +9784,7 @@
               </a:spcAft>
             </a:pPr>
             <a:r>
-              <a:rPr lang="en-US" sz="1600" dirty="0" err="1">
+              <a:rPr lang="en-US" sz="1600" dirty="0">
                 <a:effectLst/>
                 <a:latin typeface="Times New Roman" panose="02020603050405020304" pitchFamily="18" charset="0"/>
                 <a:ea typeface="Calibri" panose="020F0502020204030204" pitchFamily="34" charset="0"/>
@@ -9998,7 +9860,7 @@
         <p:spPr>
           <a:xfrm>
             <a:off x="6450171" y="4368483"/>
-            <a:ext cx="2971800" cy="0"/>
+            <a:ext cx="4046852" cy="3175"/>
           </a:xfrm>
           <a:prstGeom prst="line">
             <a:avLst/>
@@ -10635,40 +10497,6 @@
           </a:fontRef>
         </p:style>
       </p:cxnSp>
-      <p:cxnSp>
-        <p:nvCxnSpPr>
-          <p:cNvPr id="38" name="Straight Arrow Connector 37"/>
-          <p:cNvCxnSpPr/>
-          <p:nvPr/>
-        </p:nvCxnSpPr>
-        <p:spPr>
-          <a:xfrm flipV="1">
-            <a:off x="7003256" y="1696404"/>
-            <a:ext cx="0" cy="680084"/>
-          </a:xfrm>
-          <a:prstGeom prst="straightConnector1">
-            <a:avLst/>
-          </a:prstGeom>
-          <a:ln w="25400">
-            <a:headEnd type="none" w="med" len="med"/>
-            <a:tailEnd type="triangle" w="med" len="med"/>
-          </a:ln>
-        </p:spPr>
-        <p:style>
-          <a:lnRef idx="3">
-            <a:schemeClr val="dk1"/>
-          </a:lnRef>
-          <a:fillRef idx="0">
-            <a:schemeClr val="dk1"/>
-          </a:fillRef>
-          <a:effectRef idx="2">
-            <a:schemeClr val="dk1"/>
-          </a:effectRef>
-          <a:fontRef idx="minor">
-            <a:schemeClr val="tx1"/>
-          </a:fontRef>
-        </p:style>
-      </p:cxnSp>
       <p:sp>
         <p:nvSpPr>
           <p:cNvPr id="39" name="Text Box 52"/>
@@ -10966,53 +10794,19 @@
       </p:sp>
       <p:cxnSp>
         <p:nvCxnSpPr>
-          <p:cNvPr id="44" name="Elbow Connector 43"/>
-          <p:cNvCxnSpPr/>
-          <p:nvPr/>
-        </p:nvCxnSpPr>
-        <p:spPr>
-          <a:xfrm rot="16200000" flipH="1">
-            <a:off x="7648498" y="2774714"/>
-            <a:ext cx="2513963" cy="1717513"/>
-          </a:xfrm>
-          <a:prstGeom prst="bentConnector3">
-            <a:avLst>
-              <a:gd name="adj1" fmla="val 18936"/>
-            </a:avLst>
-          </a:prstGeom>
-          <a:ln w="25400">
-            <a:headEnd type="triangle" w="med" len="med"/>
-            <a:tailEnd type="none" w="med" len="med"/>
-          </a:ln>
-        </p:spPr>
-        <p:style>
-          <a:lnRef idx="3">
-            <a:schemeClr val="dk1"/>
-          </a:lnRef>
-          <a:fillRef idx="0">
-            <a:schemeClr val="dk1"/>
-          </a:fillRef>
-          <a:effectRef idx="2">
-            <a:schemeClr val="dk1"/>
-          </a:effectRef>
-          <a:fontRef idx="minor">
-            <a:schemeClr val="tx1"/>
-          </a:fontRef>
-        </p:style>
-      </p:cxnSp>
-      <p:cxnSp>
-        <p:nvCxnSpPr>
           <p:cNvPr id="45" name="Elbow Connector 44"/>
           <p:cNvCxnSpPr/>
           <p:nvPr/>
         </p:nvCxnSpPr>
         <p:spPr>
           <a:xfrm rot="10800000" flipV="1">
-            <a:off x="5339556" y="4890453"/>
-            <a:ext cx="4424680" cy="210185"/>
+            <a:off x="5339559" y="4874525"/>
+            <a:ext cx="5330931" cy="226112"/>
           </a:xfrm>
-          <a:prstGeom prst="bentConnector2">
-            <a:avLst/>
+          <a:prstGeom prst="bentConnector3">
+            <a:avLst>
+              <a:gd name="adj1" fmla="val 100357"/>
+            </a:avLst>
           </a:prstGeom>
           <a:ln w="25400">
             <a:headEnd type="none" w="med" len="med"/>
@@ -11535,7 +11329,7 @@
             <a:pPr algn="ctr"/>
             <a:r>
               <a:rPr lang="en-US" dirty="0" smtClean="0"/>
-              <a:t>12 Resource Types</a:t>
+              <a:t>13 Resource Types</a:t>
             </a:r>
             <a:endParaRPr lang="en-US" dirty="0"/>
           </a:p>
@@ -11580,6 +11374,250 @@
               <a:t> Resource Types</a:t>
             </a:r>
             <a:endParaRPr lang="en-US" dirty="0"/>
+          </a:p>
+        </p:txBody>
+      </p:sp>
+      <p:cxnSp>
+        <p:nvCxnSpPr>
+          <p:cNvPr id="67" name="Straight Arrow Connector 66"/>
+          <p:cNvCxnSpPr/>
+          <p:nvPr/>
+        </p:nvCxnSpPr>
+        <p:spPr>
+          <a:xfrm>
+            <a:off x="8152524" y="2369502"/>
+            <a:ext cx="0" cy="519431"/>
+          </a:xfrm>
+          <a:prstGeom prst="straightConnector1">
+            <a:avLst/>
+          </a:prstGeom>
+          <a:ln w="25400">
+            <a:headEnd type="triangle" w="med" len="med"/>
+            <a:tailEnd type="none" w="med" len="med"/>
+          </a:ln>
+        </p:spPr>
+        <p:style>
+          <a:lnRef idx="3">
+            <a:schemeClr val="dk1"/>
+          </a:lnRef>
+          <a:fillRef idx="0">
+            <a:schemeClr val="dk1"/>
+          </a:fillRef>
+          <a:effectRef idx="2">
+            <a:schemeClr val="dk1"/>
+          </a:effectRef>
+          <a:fontRef idx="minor">
+            <a:schemeClr val="tx1"/>
+          </a:fontRef>
+        </p:style>
+      </p:cxnSp>
+      <p:cxnSp>
+        <p:nvCxnSpPr>
+          <p:cNvPr id="70" name="Straight Connector 69"/>
+          <p:cNvCxnSpPr/>
+          <p:nvPr/>
+        </p:nvCxnSpPr>
+        <p:spPr>
+          <a:xfrm flipH="1">
+            <a:off x="10677768" y="2873938"/>
+            <a:ext cx="30822" cy="2013040"/>
+          </a:xfrm>
+          <a:prstGeom prst="line">
+            <a:avLst/>
+          </a:prstGeom>
+          <a:ln w="28575">
+            <a:headEnd type="none" w="med" len="med"/>
+            <a:tailEnd type="none" w="med" len="med"/>
+          </a:ln>
+        </p:spPr>
+        <p:style>
+          <a:lnRef idx="3">
+            <a:schemeClr val="dk1"/>
+          </a:lnRef>
+          <a:fillRef idx="0">
+            <a:schemeClr val="dk1"/>
+          </a:fillRef>
+          <a:effectRef idx="2">
+            <a:schemeClr val="dk1"/>
+          </a:effectRef>
+          <a:fontRef idx="minor">
+            <a:schemeClr val="tx1"/>
+          </a:fontRef>
+        </p:style>
+      </p:cxnSp>
+      <p:cxnSp>
+        <p:nvCxnSpPr>
+          <p:cNvPr id="72" name="Straight Connector 71"/>
+          <p:cNvCxnSpPr/>
+          <p:nvPr/>
+        </p:nvCxnSpPr>
+        <p:spPr>
+          <a:xfrm>
+            <a:off x="8152524" y="2873938"/>
+            <a:ext cx="2556066" cy="2536"/>
+          </a:xfrm>
+          <a:prstGeom prst="line">
+            <a:avLst/>
+          </a:prstGeom>
+          <a:ln w="28575">
+            <a:headEnd type="none" w="med" len="med"/>
+            <a:tailEnd type="none" w="med" len="med"/>
+          </a:ln>
+        </p:spPr>
+        <p:style>
+          <a:lnRef idx="3">
+            <a:schemeClr val="dk1"/>
+          </a:lnRef>
+          <a:fillRef idx="0">
+            <a:schemeClr val="dk1"/>
+          </a:fillRef>
+          <a:effectRef idx="2">
+            <a:schemeClr val="dk1"/>
+          </a:effectRef>
+          <a:fontRef idx="minor">
+            <a:schemeClr val="tx1"/>
+          </a:fontRef>
+        </p:style>
+      </p:cxnSp>
+      <p:cxnSp>
+        <p:nvCxnSpPr>
+          <p:cNvPr id="76" name="Straight Arrow Connector 75"/>
+          <p:cNvCxnSpPr/>
+          <p:nvPr/>
+        </p:nvCxnSpPr>
+        <p:spPr>
+          <a:xfrm flipV="1">
+            <a:off x="7028656" y="1690688"/>
+            <a:ext cx="2540" cy="673098"/>
+          </a:xfrm>
+          <a:prstGeom prst="straightConnector1">
+            <a:avLst/>
+          </a:prstGeom>
+          <a:ln w="25400">
+            <a:headEnd type="none" w="med" len="med"/>
+            <a:tailEnd type="triangle" w="med" len="med"/>
+          </a:ln>
+        </p:spPr>
+        <p:style>
+          <a:lnRef idx="3">
+            <a:schemeClr val="dk1"/>
+          </a:lnRef>
+          <a:fillRef idx="0">
+            <a:schemeClr val="dk1"/>
+          </a:fillRef>
+          <a:effectRef idx="2">
+            <a:schemeClr val="dk1"/>
+          </a:effectRef>
+          <a:fontRef idx="minor">
+            <a:schemeClr val="tx1"/>
+          </a:fontRef>
+        </p:style>
+      </p:cxnSp>
+      <p:cxnSp>
+        <p:nvCxnSpPr>
+          <p:cNvPr id="77" name="Elbow Connector 76"/>
+          <p:cNvCxnSpPr/>
+          <p:nvPr/>
+        </p:nvCxnSpPr>
+        <p:spPr>
+          <a:xfrm rot="5400000" flipH="1" flipV="1">
+            <a:off x="8937062" y="2472563"/>
+            <a:ext cx="12700" cy="2171065"/>
+          </a:xfrm>
+          <a:prstGeom prst="bentConnector3">
+            <a:avLst>
+              <a:gd name="adj1" fmla="val 2650000"/>
+            </a:avLst>
+          </a:prstGeom>
+          <a:ln w="25400">
+            <a:headEnd type="none" w="med" len="med"/>
+            <a:tailEnd type="none" w="med" len="med"/>
+          </a:ln>
+        </p:spPr>
+        <p:style>
+          <a:lnRef idx="3">
+            <a:schemeClr val="dk1"/>
+          </a:lnRef>
+          <a:fillRef idx="0">
+            <a:schemeClr val="dk1"/>
+          </a:fillRef>
+          <a:effectRef idx="2">
+            <a:schemeClr val="dk1"/>
+          </a:effectRef>
+          <a:fontRef idx="minor">
+            <a:schemeClr val="tx1"/>
+          </a:fontRef>
+        </p:style>
+      </p:cxnSp>
+      <p:sp>
+        <p:nvSpPr>
+          <p:cNvPr id="56" name="Flowchart: Document 55"/>
+          <p:cNvSpPr/>
+          <p:nvPr/>
+        </p:nvSpPr>
+        <p:spPr>
+          <a:xfrm>
+            <a:off x="9610563" y="3532188"/>
+            <a:ext cx="886460" cy="555625"/>
+          </a:xfrm>
+          <a:prstGeom prst="flowChartDocument">
+            <a:avLst/>
+          </a:prstGeom>
+          <a:solidFill>
+            <a:srgbClr val="FFCCCC"/>
+          </a:solidFill>
+          <a:ln w="12700">
+            <a:solidFill>
+              <a:schemeClr val="tx1"/>
+            </a:solidFill>
+          </a:ln>
+        </p:spPr>
+        <p:style>
+          <a:lnRef idx="1">
+            <a:schemeClr val="accent1"/>
+          </a:lnRef>
+          <a:fillRef idx="2">
+            <a:schemeClr val="accent1"/>
+          </a:fillRef>
+          <a:effectRef idx="1">
+            <a:schemeClr val="accent1"/>
+          </a:effectRef>
+          <a:fontRef idx="minor">
+            <a:schemeClr val="dk1"/>
+          </a:fontRef>
+        </p:style>
+        <p:txBody>
+          <a:bodyPr rot="0" spcFirstLastPara="0" vert="horz" wrap="square" lIns="0" tIns="0" rIns="0" bIns="0" numCol="1" spcCol="0" rtlCol="0" fromWordArt="0" anchor="ctr" anchorCtr="0" forceAA="0" compatLnSpc="1">
+            <a:prstTxWarp prst="textNoShape">
+              <a:avLst/>
+            </a:prstTxWarp>
+            <a:noAutofit/>
+          </a:bodyPr>
+          <a:lstStyle/>
+          <a:p>
+            <a:pPr marL="0" marR="0" algn="ctr">
+              <a:lnSpc>
+                <a:spcPct val="105000"/>
+              </a:lnSpc>
+              <a:spcBef>
+                <a:spcPts val="0"/>
+              </a:spcBef>
+              <a:spcAft>
+                <a:spcPts val="800"/>
+              </a:spcAft>
+            </a:pPr>
+            <a:r>
+              <a:rPr lang="en-US" sz="1200" b="1" dirty="0" smtClean="0">
+                <a:latin typeface="Times New Roman" panose="02020603050405020304" pitchFamily="18" charset="0"/>
+                <a:ea typeface="Times New Roman" panose="02020603050405020304" pitchFamily="18" charset="0"/>
+              </a:rPr>
+              <a:t>Software</a:t>
+            </a:r>
+            <a:endParaRPr lang="en-US" sz="1200" dirty="0">
+              <a:effectLst/>
+              <a:latin typeface="Times New Roman" panose="02020603050405020304" pitchFamily="18" charset="0"/>
+              <a:ea typeface="Times New Roman" panose="02020603050405020304" pitchFamily="18" charset="0"/>
+            </a:endParaRPr>
           </a:p>
         </p:txBody>
       </p:sp>
@@ -12402,7 +12440,7 @@
                                 </p:cTn>
                               </p:par>
                               <p:par>
-                                <p:cTn id="73" presetID="10" presetClass="entr" presetSubtype="0" fill="hold" nodeType="withEffect">
+                                <p:cTn id="73" presetID="10" presetClass="entr" presetSubtype="0" fill="hold" grpId="0" nodeType="withEffect">
                                   <p:stCondLst>
                                     <p:cond delay="0"/>
                                   </p:stCondLst>
@@ -12415,7 +12453,7 @@
                                           </p:stCondLst>
                                         </p:cTn>
                                         <p:tgtEl>
-                                          <p:spTgt spid="38"/>
+                                          <p:spTgt spid="32"/>
                                         </p:tgtEl>
                                         <p:attrNameLst>
                                           <p:attrName>style.visibility</p:attrName>
@@ -12429,7 +12467,7 @@
                                       <p:cBhvr>
                                         <p:cTn id="75" dur="500"/>
                                         <p:tgtEl>
-                                          <p:spTgt spid="38"/>
+                                          <p:spTgt spid="32"/>
                                         </p:tgtEl>
                                       </p:cBhvr>
                                     </p:animEffect>
@@ -12437,7 +12475,7 @@
                                 </p:cTn>
                               </p:par>
                               <p:par>
-                                <p:cTn id="76" presetID="10" presetClass="entr" presetSubtype="0" fill="hold" grpId="0" nodeType="withEffect">
+                                <p:cTn id="76" presetID="10" presetClass="entr" presetSubtype="0" fill="hold" nodeType="withEffect">
                                   <p:stCondLst>
                                     <p:cond delay="0"/>
                                   </p:stCondLst>
@@ -12450,7 +12488,7 @@
                                           </p:stCondLst>
                                         </p:cTn>
                                         <p:tgtEl>
-                                          <p:spTgt spid="32"/>
+                                          <p:spTgt spid="30"/>
                                         </p:tgtEl>
                                         <p:attrNameLst>
                                           <p:attrName>style.visibility</p:attrName>
@@ -12464,7 +12502,7 @@
                                       <p:cBhvr>
                                         <p:cTn id="78" dur="500"/>
                                         <p:tgtEl>
-                                          <p:spTgt spid="32"/>
+                                          <p:spTgt spid="30"/>
                                         </p:tgtEl>
                                       </p:cBhvr>
                                     </p:animEffect>
@@ -12485,7 +12523,7 @@
                                           </p:stCondLst>
                                         </p:cTn>
                                         <p:tgtEl>
-                                          <p:spTgt spid="30"/>
+                                          <p:spTgt spid="35"/>
                                         </p:tgtEl>
                                         <p:attrNameLst>
                                           <p:attrName>style.visibility</p:attrName>
@@ -12498,41 +12536,6 @@
                                     <p:animEffect transition="in" filter="fade">
                                       <p:cBhvr>
                                         <p:cTn id="81" dur="500"/>
-                                        <p:tgtEl>
-                                          <p:spTgt spid="30"/>
-                                        </p:tgtEl>
-                                      </p:cBhvr>
-                                    </p:animEffect>
-                                  </p:childTnLst>
-                                </p:cTn>
-                              </p:par>
-                              <p:par>
-                                <p:cTn id="82" presetID="10" presetClass="entr" presetSubtype="0" fill="hold" nodeType="withEffect">
-                                  <p:stCondLst>
-                                    <p:cond delay="0"/>
-                                  </p:stCondLst>
-                                  <p:childTnLst>
-                                    <p:set>
-                                      <p:cBhvr>
-                                        <p:cTn id="83" dur="1" fill="hold">
-                                          <p:stCondLst>
-                                            <p:cond delay="0"/>
-                                          </p:stCondLst>
-                                        </p:cTn>
-                                        <p:tgtEl>
-                                          <p:spTgt spid="35"/>
-                                        </p:tgtEl>
-                                        <p:attrNameLst>
-                                          <p:attrName>style.visibility</p:attrName>
-                                        </p:attrNameLst>
-                                      </p:cBhvr>
-                                      <p:to>
-                                        <p:strVal val="visible"/>
-                                      </p:to>
-                                    </p:set>
-                                    <p:animEffect transition="in" filter="fade">
-                                      <p:cBhvr>
-                                        <p:cTn id="84" dur="500"/>
                                         <p:tgtEl>
                                           <p:spTgt spid="35"/>
                                         </p:tgtEl>
@@ -12548,26 +12551,26 @@
                     </p:cTn>
                   </p:par>
                   <p:par>
-                    <p:cTn id="85" fill="hold">
+                    <p:cTn id="82" fill="hold">
                       <p:stCondLst>
                         <p:cond delay="indefinite"/>
                       </p:stCondLst>
                       <p:childTnLst>
                         <p:par>
-                          <p:cTn id="86" fill="hold">
+                          <p:cTn id="83" fill="hold">
                             <p:stCondLst>
                               <p:cond delay="0"/>
                             </p:stCondLst>
                             <p:childTnLst>
                               <p:par>
-                                <p:cTn id="87" presetID="10" presetClass="entr" presetSubtype="0" fill="hold" grpId="0" nodeType="clickEffect">
+                                <p:cTn id="84" presetID="10" presetClass="entr" presetSubtype="0" fill="hold" grpId="0" nodeType="clickEffect">
                                   <p:stCondLst>
                                     <p:cond delay="0"/>
                                   </p:stCondLst>
                                   <p:childTnLst>
                                     <p:set>
                                       <p:cBhvr>
-                                        <p:cTn id="88" dur="1" fill="hold">
+                                        <p:cTn id="85" dur="1" fill="hold">
                                           <p:stCondLst>
                                             <p:cond delay="0"/>
                                           </p:stCondLst>
@@ -12585,7 +12588,7 @@
                                     </p:set>
                                     <p:animEffect transition="in" filter="fade">
                                       <p:cBhvr>
-                                        <p:cTn id="89" dur="500"/>
+                                        <p:cTn id="86" dur="500"/>
                                         <p:tgtEl>
                                           <p:spTgt spid="3"/>
                                         </p:tgtEl>
@@ -12601,32 +12604,67 @@
                     </p:cTn>
                   </p:par>
                   <p:par>
-                    <p:cTn id="90" fill="hold">
+                    <p:cTn id="87" fill="hold">
                       <p:stCondLst>
                         <p:cond delay="indefinite"/>
                       </p:stCondLst>
                       <p:childTnLst>
                         <p:par>
-                          <p:cTn id="91" fill="hold">
+                          <p:cTn id="88" fill="hold">
                             <p:stCondLst>
                               <p:cond delay="0"/>
                             </p:stCondLst>
                             <p:childTnLst>
                               <p:par>
-                                <p:cTn id="92" presetID="10" presetClass="entr" presetSubtype="0" fill="hold" nodeType="clickEffect">
+                                <p:cTn id="89" presetID="10" presetClass="entr" presetSubtype="0" fill="hold" nodeType="clickEffect">
                                   <p:stCondLst>
                                     <p:cond delay="0"/>
                                   </p:stCondLst>
                                   <p:childTnLst>
                                     <p:set>
                                       <p:cBhvr>
+                                        <p:cTn id="90" dur="1" fill="hold">
+                                          <p:stCondLst>
+                                            <p:cond delay="0"/>
+                                          </p:stCondLst>
+                                        </p:cTn>
+                                        <p:tgtEl>
+                                          <p:spTgt spid="4"/>
+                                        </p:tgtEl>
+                                        <p:attrNameLst>
+                                          <p:attrName>style.visibility</p:attrName>
+                                        </p:attrNameLst>
+                                      </p:cBhvr>
+                                      <p:to>
+                                        <p:strVal val="visible"/>
+                                      </p:to>
+                                    </p:set>
+                                    <p:animEffect transition="in" filter="fade">
+                                      <p:cBhvr>
+                                        <p:cTn id="91" dur="500"/>
+                                        <p:tgtEl>
+                                          <p:spTgt spid="4"/>
+                                        </p:tgtEl>
+                                      </p:cBhvr>
+                                    </p:animEffect>
+                                  </p:childTnLst>
+                                </p:cTn>
+                              </p:par>
+                              <p:par>
+                                <p:cTn id="92" presetID="10" presetClass="entr" presetSubtype="0" fill="hold" grpId="0" nodeType="withEffect">
+                                  <p:stCondLst>
+                                    <p:cond delay="0"/>
+                                  </p:stCondLst>
+                                  <p:childTnLst>
+                                    <p:set>
+                                      <p:cBhvr>
                                         <p:cTn id="93" dur="1" fill="hold">
                                           <p:stCondLst>
                                             <p:cond delay="0"/>
                                           </p:stCondLst>
                                         </p:cTn>
                                         <p:tgtEl>
-                                          <p:spTgt spid="4"/>
+                                          <p:spTgt spid="17"/>
                                         </p:tgtEl>
                                         <p:attrNameLst>
                                           <p:attrName>style.visibility</p:attrName>
@@ -12640,7 +12678,7 @@
                                       <p:cBhvr>
                                         <p:cTn id="94" dur="500"/>
                                         <p:tgtEl>
-                                          <p:spTgt spid="4"/>
+                                          <p:spTgt spid="17"/>
                                         </p:tgtEl>
                                       </p:cBhvr>
                                     </p:animEffect>
@@ -12661,7 +12699,7 @@
                                           </p:stCondLst>
                                         </p:cTn>
                                         <p:tgtEl>
-                                          <p:spTgt spid="17"/>
+                                          <p:spTgt spid="18"/>
                                         </p:tgtEl>
                                         <p:attrNameLst>
                                           <p:attrName>style.visibility</p:attrName>
@@ -12675,7 +12713,7 @@
                                       <p:cBhvr>
                                         <p:cTn id="97" dur="500"/>
                                         <p:tgtEl>
-                                          <p:spTgt spid="17"/>
+                                          <p:spTgt spid="18"/>
                                         </p:tgtEl>
                                       </p:cBhvr>
                                     </p:animEffect>
@@ -12696,7 +12734,7 @@
                                           </p:stCondLst>
                                         </p:cTn>
                                         <p:tgtEl>
-                                          <p:spTgt spid="18"/>
+                                          <p:spTgt spid="19"/>
                                         </p:tgtEl>
                                         <p:attrNameLst>
                                           <p:attrName>style.visibility</p:attrName>
@@ -12710,7 +12748,7 @@
                                       <p:cBhvr>
                                         <p:cTn id="100" dur="500"/>
                                         <p:tgtEl>
-                                          <p:spTgt spid="18"/>
+                                          <p:spTgt spid="19"/>
                                         </p:tgtEl>
                                       </p:cBhvr>
                                     </p:animEffect>
@@ -12731,7 +12769,7 @@
                                           </p:stCondLst>
                                         </p:cTn>
                                         <p:tgtEl>
-                                          <p:spTgt spid="19"/>
+                                          <p:spTgt spid="20"/>
                                         </p:tgtEl>
                                         <p:attrNameLst>
                                           <p:attrName>style.visibility</p:attrName>
@@ -12745,7 +12783,7 @@
                                       <p:cBhvr>
                                         <p:cTn id="103" dur="500"/>
                                         <p:tgtEl>
-                                          <p:spTgt spid="19"/>
+                                          <p:spTgt spid="20"/>
                                         </p:tgtEl>
                                       </p:cBhvr>
                                     </p:animEffect>
@@ -12753,7 +12791,7 @@
                                 </p:cTn>
                               </p:par>
                               <p:par>
-                                <p:cTn id="104" presetID="10" presetClass="entr" presetSubtype="0" fill="hold" grpId="0" nodeType="withEffect">
+                                <p:cTn id="104" presetID="10" presetClass="entr" presetSubtype="0" fill="hold" nodeType="withEffect">
                                   <p:stCondLst>
                                     <p:cond delay="0"/>
                                   </p:stCondLst>
@@ -12766,7 +12804,7 @@
                                           </p:stCondLst>
                                         </p:cTn>
                                         <p:tgtEl>
-                                          <p:spTgt spid="20"/>
+                                          <p:spTgt spid="26"/>
                                         </p:tgtEl>
                                         <p:attrNameLst>
                                           <p:attrName>style.visibility</p:attrName>
@@ -12780,7 +12818,7 @@
                                       <p:cBhvr>
                                         <p:cTn id="106" dur="500"/>
                                         <p:tgtEl>
-                                          <p:spTgt spid="20"/>
+                                          <p:spTgt spid="26"/>
                                         </p:tgtEl>
                                       </p:cBhvr>
                                     </p:animEffect>
@@ -12801,7 +12839,7 @@
                                           </p:stCondLst>
                                         </p:cTn>
                                         <p:tgtEl>
-                                          <p:spTgt spid="26"/>
+                                          <p:spTgt spid="40"/>
                                         </p:tgtEl>
                                         <p:attrNameLst>
                                           <p:attrName>style.visibility</p:attrName>
@@ -12815,7 +12853,7 @@
                                       <p:cBhvr>
                                         <p:cTn id="109" dur="500"/>
                                         <p:tgtEl>
-                                          <p:spTgt spid="26"/>
+                                          <p:spTgt spid="40"/>
                                         </p:tgtEl>
                                       </p:cBhvr>
                                     </p:animEffect>
@@ -12836,7 +12874,7 @@
                                           </p:stCondLst>
                                         </p:cTn>
                                         <p:tgtEl>
-                                          <p:spTgt spid="40"/>
+                                          <p:spTgt spid="41"/>
                                         </p:tgtEl>
                                         <p:attrNameLst>
                                           <p:attrName>style.visibility</p:attrName>
@@ -12850,7 +12888,7 @@
                                       <p:cBhvr>
                                         <p:cTn id="112" dur="500"/>
                                         <p:tgtEl>
-                                          <p:spTgt spid="40"/>
+                                          <p:spTgt spid="41"/>
                                         </p:tgtEl>
                                       </p:cBhvr>
                                     </p:animEffect>
@@ -12858,7 +12896,7 @@
                                 </p:cTn>
                               </p:par>
                               <p:par>
-                                <p:cTn id="113" presetID="10" presetClass="entr" presetSubtype="0" fill="hold" nodeType="withEffect">
+                                <p:cTn id="113" presetID="10" presetClass="entr" presetSubtype="0" fill="hold" grpId="0" nodeType="withEffect">
                                   <p:stCondLst>
                                     <p:cond delay="0"/>
                                   </p:stCondLst>
@@ -12871,7 +12909,7 @@
                                           </p:stCondLst>
                                         </p:cTn>
                                         <p:tgtEl>
-                                          <p:spTgt spid="41"/>
+                                          <p:spTgt spid="42"/>
                                         </p:tgtEl>
                                         <p:attrNameLst>
                                           <p:attrName>style.visibility</p:attrName>
@@ -12885,7 +12923,7 @@
                                       <p:cBhvr>
                                         <p:cTn id="115" dur="500"/>
                                         <p:tgtEl>
-                                          <p:spTgt spid="41"/>
+                                          <p:spTgt spid="42"/>
                                         </p:tgtEl>
                                       </p:cBhvr>
                                     </p:animEffect>
@@ -12906,7 +12944,7 @@
                                           </p:stCondLst>
                                         </p:cTn>
                                         <p:tgtEl>
-                                          <p:spTgt spid="42"/>
+                                          <p:spTgt spid="43"/>
                                         </p:tgtEl>
                                         <p:attrNameLst>
                                           <p:attrName>style.visibility</p:attrName>
@@ -12920,7 +12958,7 @@
                                       <p:cBhvr>
                                         <p:cTn id="118" dur="500"/>
                                         <p:tgtEl>
-                                          <p:spTgt spid="42"/>
+                                          <p:spTgt spid="43"/>
                                         </p:tgtEl>
                                       </p:cBhvr>
                                     </p:animEffect>
@@ -12928,7 +12966,7 @@
                                 </p:cTn>
                               </p:par>
                               <p:par>
-                                <p:cTn id="119" presetID="10" presetClass="entr" presetSubtype="0" fill="hold" grpId="0" nodeType="withEffect">
+                                <p:cTn id="119" presetID="10" presetClass="entr" presetSubtype="0" fill="hold" nodeType="withEffect">
                                   <p:stCondLst>
                                     <p:cond delay="0"/>
                                   </p:stCondLst>
@@ -12941,7 +12979,7 @@
                                           </p:stCondLst>
                                         </p:cTn>
                                         <p:tgtEl>
-                                          <p:spTgt spid="43"/>
+                                          <p:spTgt spid="45"/>
                                         </p:tgtEl>
                                         <p:attrNameLst>
                                           <p:attrName>style.visibility</p:attrName>
@@ -12955,7 +12993,7 @@
                                       <p:cBhvr>
                                         <p:cTn id="121" dur="500"/>
                                         <p:tgtEl>
-                                          <p:spTgt spid="43"/>
+                                          <p:spTgt spid="45"/>
                                         </p:tgtEl>
                                       </p:cBhvr>
                                     </p:animEffect>
@@ -12976,7 +13014,7 @@
                                           </p:stCondLst>
                                         </p:cTn>
                                         <p:tgtEl>
-                                          <p:spTgt spid="45"/>
+                                          <p:spTgt spid="46"/>
                                         </p:tgtEl>
                                         <p:attrNameLst>
                                           <p:attrName>style.visibility</p:attrName>
@@ -12990,7 +13028,7 @@
                                       <p:cBhvr>
                                         <p:cTn id="124" dur="500"/>
                                         <p:tgtEl>
-                                          <p:spTgt spid="45"/>
+                                          <p:spTgt spid="46"/>
                                         </p:tgtEl>
                                       </p:cBhvr>
                                     </p:animEffect>
@@ -13011,7 +13049,7 @@
                                           </p:stCondLst>
                                         </p:cTn>
                                         <p:tgtEl>
-                                          <p:spTgt spid="46"/>
+                                          <p:spTgt spid="47"/>
                                         </p:tgtEl>
                                         <p:attrNameLst>
                                           <p:attrName>style.visibility</p:attrName>
@@ -13025,7 +13063,7 @@
                                       <p:cBhvr>
                                         <p:cTn id="127" dur="500"/>
                                         <p:tgtEl>
-                                          <p:spTgt spid="46"/>
+                                          <p:spTgt spid="47"/>
                                         </p:tgtEl>
                                       </p:cBhvr>
                                     </p:animEffect>
@@ -13046,7 +13084,7 @@
                                           </p:stCondLst>
                                         </p:cTn>
                                         <p:tgtEl>
-                                          <p:spTgt spid="47"/>
+                                          <p:spTgt spid="48"/>
                                         </p:tgtEl>
                                         <p:attrNameLst>
                                           <p:attrName>style.visibility</p:attrName>
@@ -13060,7 +13098,7 @@
                                       <p:cBhvr>
                                         <p:cTn id="130" dur="500"/>
                                         <p:tgtEl>
-                                          <p:spTgt spid="47"/>
+                                          <p:spTgt spid="48"/>
                                         </p:tgtEl>
                                       </p:cBhvr>
                                     </p:animEffect>
@@ -13068,7 +13106,7 @@
                                 </p:cTn>
                               </p:par>
                               <p:par>
-                                <p:cTn id="131" presetID="10" presetClass="entr" presetSubtype="0" fill="hold" nodeType="withEffect">
+                                <p:cTn id="131" presetID="10" presetClass="entr" presetSubtype="0" fill="hold" grpId="0" nodeType="withEffect">
                                   <p:stCondLst>
                                     <p:cond delay="0"/>
                                   </p:stCondLst>
@@ -13081,7 +13119,7 @@
                                           </p:stCondLst>
                                         </p:cTn>
                                         <p:tgtEl>
-                                          <p:spTgt spid="48"/>
+                                          <p:spTgt spid="52"/>
                                         </p:tgtEl>
                                         <p:attrNameLst>
                                           <p:attrName>style.visibility</p:attrName>
@@ -13095,77 +13133,7 @@
                                       <p:cBhvr>
                                         <p:cTn id="133" dur="500"/>
                                         <p:tgtEl>
-                                          <p:spTgt spid="48"/>
-                                        </p:tgtEl>
-                                      </p:cBhvr>
-                                    </p:animEffect>
-                                  </p:childTnLst>
-                                </p:cTn>
-                              </p:par>
-                              <p:par>
-                                <p:cTn id="134" presetID="10" presetClass="entr" presetSubtype="0" fill="hold" grpId="0" nodeType="withEffect">
-                                  <p:stCondLst>
-                                    <p:cond delay="0"/>
-                                  </p:stCondLst>
-                                  <p:childTnLst>
-                                    <p:set>
-                                      <p:cBhvr>
-                                        <p:cTn id="135" dur="1" fill="hold">
-                                          <p:stCondLst>
-                                            <p:cond delay="0"/>
-                                          </p:stCondLst>
-                                        </p:cTn>
-                                        <p:tgtEl>
                                           <p:spTgt spid="52"/>
-                                        </p:tgtEl>
-                                        <p:attrNameLst>
-                                          <p:attrName>style.visibility</p:attrName>
-                                        </p:attrNameLst>
-                                      </p:cBhvr>
-                                      <p:to>
-                                        <p:strVal val="visible"/>
-                                      </p:to>
-                                    </p:set>
-                                    <p:animEffect transition="in" filter="fade">
-                                      <p:cBhvr>
-                                        <p:cTn id="136" dur="500"/>
-                                        <p:tgtEl>
-                                          <p:spTgt spid="52"/>
-                                        </p:tgtEl>
-                                      </p:cBhvr>
-                                    </p:animEffect>
-                                  </p:childTnLst>
-                                </p:cTn>
-                              </p:par>
-                              <p:par>
-                                <p:cTn id="137" presetID="10" presetClass="entr" presetSubtype="0" fill="hold" nodeType="withEffect">
-                                  <p:stCondLst>
-                                    <p:cond delay="0"/>
-                                  </p:stCondLst>
-                                  <p:childTnLst>
-                                    <p:set>
-                                      <p:cBhvr>
-                                        <p:cTn id="138" dur="1" fill="hold">
-                                          <p:stCondLst>
-                                            <p:cond delay="0"/>
-                                          </p:stCondLst>
-                                        </p:cTn>
-                                        <p:tgtEl>
-                                          <p:spTgt spid="44"/>
-                                        </p:tgtEl>
-                                        <p:attrNameLst>
-                                          <p:attrName>style.visibility</p:attrName>
-                                        </p:attrNameLst>
-                                      </p:cBhvr>
-                                      <p:to>
-                                        <p:strVal val="visible"/>
-                                      </p:to>
-                                    </p:set>
-                                    <p:animEffect transition="in" filter="fade">
-                                      <p:cBhvr>
-                                        <p:cTn id="139" dur="500"/>
-                                        <p:tgtEl>
-                                          <p:spTgt spid="44"/>
                                         </p:tgtEl>
                                       </p:cBhvr>
                                     </p:animEffect>
@@ -13179,32 +13147,102 @@
                     </p:cTn>
                   </p:par>
                   <p:par>
-                    <p:cTn id="140" fill="hold">
+                    <p:cTn id="134" fill="hold">
                       <p:stCondLst>
                         <p:cond delay="indefinite"/>
                       </p:stCondLst>
                       <p:childTnLst>
                         <p:par>
-                          <p:cTn id="141" fill="hold">
+                          <p:cTn id="135" fill="hold">
                             <p:stCondLst>
                               <p:cond delay="0"/>
                             </p:stCondLst>
                             <p:childTnLst>
                               <p:par>
-                                <p:cTn id="142" presetID="10" presetClass="entr" presetSubtype="0" fill="hold" grpId="0" nodeType="clickEffect">
+                                <p:cTn id="136" presetID="10" presetClass="entr" presetSubtype="0" fill="hold" grpId="0" nodeType="clickEffect">
                                   <p:stCondLst>
                                     <p:cond delay="0"/>
                                   </p:stCondLst>
                                   <p:childTnLst>
                                     <p:set>
                                       <p:cBhvr>
+                                        <p:cTn id="137" dur="1" fill="hold">
+                                          <p:stCondLst>
+                                            <p:cond delay="0"/>
+                                          </p:stCondLst>
+                                        </p:cTn>
+                                        <p:tgtEl>
+                                          <p:spTgt spid="55"/>
+                                        </p:tgtEl>
+                                        <p:attrNameLst>
+                                          <p:attrName>style.visibility</p:attrName>
+                                        </p:attrNameLst>
+                                      </p:cBhvr>
+                                      <p:to>
+                                        <p:strVal val="visible"/>
+                                      </p:to>
+                                    </p:set>
+                                    <p:animEffect transition="in" filter="fade">
+                                      <p:cBhvr>
+                                        <p:cTn id="138" dur="500"/>
+                                        <p:tgtEl>
+                                          <p:spTgt spid="55"/>
+                                        </p:tgtEl>
+                                      </p:cBhvr>
+                                    </p:animEffect>
+                                  </p:childTnLst>
+                                </p:cTn>
+                              </p:par>
+                              <p:par>
+                                <p:cTn id="139" presetID="10" presetClass="entr" presetSubtype="0" fill="hold" grpId="0" nodeType="withEffect">
+                                  <p:stCondLst>
+                                    <p:cond delay="0"/>
+                                  </p:stCondLst>
+                                  <p:childTnLst>
+                                    <p:set>
+                                      <p:cBhvr>
+                                        <p:cTn id="140" dur="1" fill="hold">
+                                          <p:stCondLst>
+                                            <p:cond delay="0"/>
+                                          </p:stCondLst>
+                                        </p:cTn>
+                                        <p:tgtEl>
+                                          <p:spTgt spid="56"/>
+                                        </p:tgtEl>
+                                        <p:attrNameLst>
+                                          <p:attrName>style.visibility</p:attrName>
+                                        </p:attrNameLst>
+                                      </p:cBhvr>
+                                      <p:to>
+                                        <p:strVal val="visible"/>
+                                      </p:to>
+                                    </p:set>
+                                    <p:animEffect transition="in" filter="fade">
+                                      <p:cBhvr>
+                                        <p:cTn id="141" dur="500"/>
+                                        <p:tgtEl>
+                                          <p:spTgt spid="56"/>
+                                        </p:tgtEl>
+                                      </p:cBhvr>
+                                    </p:animEffect>
+                                  </p:childTnLst>
+                                </p:cTn>
+                              </p:par>
+                              <p:par>
+                                <p:cTn id="142" presetID="10" presetClass="entr" presetSubtype="0" fill="hold" nodeType="withEffect">
+                                  <p:stCondLst>
+                                    <p:cond delay="0"/>
+                                  </p:stCondLst>
+                                  <p:childTnLst>
+                                    <p:set>
+                                      <p:cBhvr>
                                         <p:cTn id="143" dur="1" fill="hold">
                                           <p:stCondLst>
                                             <p:cond delay="0"/>
                                           </p:stCondLst>
                                         </p:cTn>
                                         <p:tgtEl>
-                                          <p:spTgt spid="55"/>
+                                          <p:spTgt spid="67"/>
                                         </p:tgtEl>
                                         <p:attrNameLst>
                                           <p:attrName>style.visibility</p:attrName>
@@ -13218,7 +13256,77 @@
                                       <p:cBhvr>
                                         <p:cTn id="144" dur="500"/>
                                         <p:tgtEl>
-                                          <p:spTgt spid="55"/>
+                                          <p:spTgt spid="67"/>
+                                        </p:tgtEl>
+                                      </p:cBhvr>
+                                    </p:animEffect>
+                                  </p:childTnLst>
+                                </p:cTn>
+                              </p:par>
+                              <p:par>
+                                <p:cTn id="145" presetID="10" presetClass="entr" presetSubtype="0" fill="hold" nodeType="withEffect">
+                                  <p:stCondLst>
+                                    <p:cond delay="0"/>
+                                  </p:stCondLst>
+                                  <p:childTnLst>
+                                    <p:set>
+                                      <p:cBhvr>
+                                        <p:cTn id="146" dur="1" fill="hold">
+                                          <p:stCondLst>
+                                            <p:cond delay="0"/>
+                                          </p:stCondLst>
+                                        </p:cTn>
+                                        <p:tgtEl>
+                                          <p:spTgt spid="76"/>
+                                        </p:tgtEl>
+                                        <p:attrNameLst>
+                                          <p:attrName>style.visibility</p:attrName>
+                                        </p:attrNameLst>
+                                      </p:cBhvr>
+                                      <p:to>
+                                        <p:strVal val="visible"/>
+                                      </p:to>
+                                    </p:set>
+                                    <p:animEffect transition="in" filter="fade">
+                                      <p:cBhvr>
+                                        <p:cTn id="147" dur="500"/>
+                                        <p:tgtEl>
+                                          <p:spTgt spid="76"/>
+                                        </p:tgtEl>
+                                      </p:cBhvr>
+                                    </p:animEffect>
+                                  </p:childTnLst>
+                                </p:cTn>
+                              </p:par>
+                              <p:par>
+                                <p:cTn id="148" presetID="10" presetClass="entr" presetSubtype="0" fill="hold" nodeType="withEffect">
+                                  <p:stCondLst>
+                                    <p:cond delay="0"/>
+                                  </p:stCondLst>
+                                  <p:childTnLst>
+                                    <p:set>
+                                      <p:cBhvr>
+                                        <p:cTn id="149" dur="1" fill="hold">
+                                          <p:stCondLst>
+                                            <p:cond delay="0"/>
+                                          </p:stCondLst>
+                                        </p:cTn>
+                                        <p:tgtEl>
+                                          <p:spTgt spid="77"/>
+                                        </p:tgtEl>
+                                        <p:attrNameLst>
+                                          <p:attrName>style.visibility</p:attrName>
+                                        </p:attrNameLst>
+                                      </p:cBhvr>
+                                      <p:to>
+                                        <p:strVal val="visible"/>
+                                      </p:to>
+                                    </p:set>
+                                    <p:animEffect transition="in" filter="fade">
+                                      <p:cBhvr>
+                                        <p:cTn id="150" dur="500"/>
+                                        <p:tgtEl>
+                                          <p:spTgt spid="77"/>
                                         </p:tgtEl>
                                       </p:cBhvr>
                                     </p:animEffect>
@@ -13277,6 +13385,7 @@
       <p:bldP spid="52" grpId="0" animBg="1"/>
       <p:bldP spid="3" grpId="0"/>
       <p:bldP spid="55" grpId="0"/>
+      <p:bldP spid="56" grpId="0" animBg="1"/>
     </p:bldLst>
   </p:timing>
 </p:sld>

</xml_diff>